<commit_message>
kami 1234 pr and 4 tis started
</commit_message>
<xml_diff>
--- a/zkami/1/Отчетная презентация.pptx
+++ b/zkami/1/Отчетная презентация.pptx
@@ -292,7 +292,7 @@
       </p15:sldGuideLst>
     </p:ext>
     <p:ext uri="GoogleSlidesCustomDataVersion2">
-      <go:slidesCustomData xmlns="" xmlns:mc="http://schemas.openxmlformats.org/markup-compatibility/2006" xmlns:mv="urn:schemas-microsoft-com:mac:vml" xmlns:c="http://schemas.openxmlformats.org/drawingml/2006/chart" xmlns:dgm="http://schemas.openxmlformats.org/drawingml/2006/diagram" xmlns:o="urn:schemas-microsoft-com:office:office" xmlns:v="urn:schemas-microsoft-com:vml" xmlns:pvml="urn:schemas-microsoft-com:office:powerpoint" xmlns:com="http://schemas.openxmlformats.org/drawingml/2006/compatibility" xmlns:p14="http://schemas.microsoft.com/office/powerpoint/2010/main" xmlns:p15="http://schemas.microsoft.com/office/powerpoint/2012/main" xmlns:ahyp="http://schemas.microsoft.com/office/drawing/2018/hyperlinkcolor" xmlns:go="http://customooxmlschemas.google.com/" r:id="rId28" roundtripDataSignature="AMtx7miPjJux61L6IzM4ntjgaCOPDBAZFw=="/>
+      <go:slidesCustomData xmlns:go="http://customooxmlschemas.google.com/" xmlns:ahyp="http://schemas.microsoft.com/office/drawing/2018/hyperlinkcolor" xmlns:p15="http://schemas.microsoft.com/office/powerpoint/2012/main" xmlns:p14="http://schemas.microsoft.com/office/powerpoint/2010/main" xmlns:com="http://schemas.openxmlformats.org/drawingml/2006/compatibility" xmlns:pvml="urn:schemas-microsoft-com:office:powerpoint" xmlns:v="urn:schemas-microsoft-com:vml" xmlns:o="urn:schemas-microsoft-com:office:office" xmlns:dgm="http://schemas.openxmlformats.org/drawingml/2006/diagram" xmlns:c="http://schemas.openxmlformats.org/drawingml/2006/chart" xmlns:mv="urn:schemas-microsoft-com:mac:vml" xmlns:mc="http://schemas.openxmlformats.org/markup-compatibility/2006" xmlns="" r:id="rId28" roundtripDataSignature="AMtx7miPjJux61L6IzM4ntjgaCOPDBAZFw=="/>
     </p:ext>
   </p:extLst>
 </p:presentation>
@@ -24738,7 +24738,7 @@
               <a:t>ФИО обучающегося: </a:t>
             </a:r>
             <a:r>
-              <a:rPr lang="ru-RU" sz="2000" b="0" i="0" u="none" strike="noStrike" cap="none" dirty="0" err="1">
+              <a:rPr lang="ru-RU" sz="2000" dirty="0" err="1">
                 <a:solidFill>
                   <a:schemeClr val="tx1"/>
                 </a:solidFill>
@@ -24747,10 +24747,10 @@
                 <a:cs typeface="Calibri"/>
                 <a:sym typeface="Calibri"/>
               </a:rPr>
-              <a:t>Облеухин</a:t>
+              <a:t>Разанова</a:t>
             </a:r>
             <a:r>
-              <a:rPr lang="ru-RU" sz="2000" b="0" i="0" u="none" strike="noStrike" cap="none" dirty="0">
+              <a:rPr lang="ru-RU" sz="2000" dirty="0">
                 <a:solidFill>
                   <a:schemeClr val="tx1"/>
                 </a:solidFill>
@@ -24759,7 +24759,19 @@
                 <a:cs typeface="Calibri"/>
                 <a:sym typeface="Calibri"/>
               </a:rPr>
-              <a:t> Максим Вадимович</a:t>
+              <a:t> Камила </a:t>
+            </a:r>
+            <a:r>
+              <a:rPr lang="ru-RU" sz="2000" dirty="0" err="1">
+                <a:solidFill>
+                  <a:schemeClr val="tx1"/>
+                </a:solidFill>
+                <a:latin typeface="Calibri"/>
+                <a:ea typeface="Calibri"/>
+                <a:cs typeface="Calibri"/>
+                <a:sym typeface="Calibri"/>
+              </a:rPr>
+              <a:t>Разановна</a:t>
             </a:r>
             <a:endParaRPr sz="1400" b="0" i="0" u="none" strike="noStrike" cap="none" dirty="0">
               <a:solidFill>
@@ -24811,7 +24823,7 @@
                 <a:cs typeface="Calibri"/>
                 <a:sym typeface="Calibri"/>
               </a:rPr>
-              <a:t>ДКИП-381</a:t>
+              <a:t>ДКИП-305</a:t>
             </a:r>
             <a:endParaRPr sz="1400" b="0" i="0" u="none" strike="noStrike" cap="none" dirty="0">
               <a:solidFill>
@@ -25379,10 +25391,10 @@
       </p:sp>
       <p:pic>
         <p:nvPicPr>
-          <p:cNvPr id="2" name="Рисунок 1">
+          <p:cNvPr id="3" name="Рисунок 2">
             <a:extLst>
               <a:ext uri="{FF2B5EF4-FFF2-40B4-BE49-F238E27FC236}">
-                <a16:creationId xmlns:a16="http://schemas.microsoft.com/office/drawing/2014/main" id="{6CD0DFCB-2E44-99FE-99CD-D64ECAF19AB9}"/>
+                <a16:creationId xmlns:a16="http://schemas.microsoft.com/office/drawing/2014/main" id="{CAE7F30A-8C66-7D0B-0F14-D300718BCD46}"/>
               </a:ext>
             </a:extLst>
           </p:cNvPr>
@@ -25399,8 +25411,8 @@
         </p:blipFill>
         <p:spPr>
           <a:xfrm>
-            <a:off x="2436495" y="2947194"/>
-            <a:ext cx="5820410" cy="1666875"/>
+            <a:off x="2376487" y="3092926"/>
+            <a:ext cx="5940425" cy="1375410"/>
           </a:xfrm>
           <a:prstGeom prst="rect">
             <a:avLst/>
@@ -25641,10 +25653,10 @@
       </p:sp>
       <p:pic>
         <p:nvPicPr>
-          <p:cNvPr id="2" name="Рисунок 1">
+          <p:cNvPr id="3" name="Рисунок 2">
             <a:extLst>
               <a:ext uri="{FF2B5EF4-FFF2-40B4-BE49-F238E27FC236}">
-                <a16:creationId xmlns:a16="http://schemas.microsoft.com/office/drawing/2014/main" id="{7894D400-B2CE-9328-90D5-F425D5B677CB}"/>
+                <a16:creationId xmlns:a16="http://schemas.microsoft.com/office/drawing/2014/main" id="{4407C6E4-CC4F-D813-72D8-17A5561B8698}"/>
               </a:ext>
             </a:extLst>
           </p:cNvPr>
@@ -25661,8 +25673,8 @@
         </p:blipFill>
         <p:spPr>
           <a:xfrm>
-            <a:off x="2376487" y="2998311"/>
-            <a:ext cx="5940425" cy="1564640"/>
+            <a:off x="2717482" y="2913856"/>
+            <a:ext cx="5258435" cy="1733550"/>
           </a:xfrm>
           <a:prstGeom prst="rect">
             <a:avLst/>
@@ -25903,10 +25915,10 @@
       </p:sp>
       <p:pic>
         <p:nvPicPr>
-          <p:cNvPr id="2" name="Рисунок 1">
+          <p:cNvPr id="3" name="Рисунок 2">
             <a:extLst>
               <a:ext uri="{FF2B5EF4-FFF2-40B4-BE49-F238E27FC236}">
-                <a16:creationId xmlns:a16="http://schemas.microsoft.com/office/drawing/2014/main" id="{57D1EEF6-363B-EDFA-2A47-1CB2F9760538}"/>
+                <a16:creationId xmlns:a16="http://schemas.microsoft.com/office/drawing/2014/main" id="{3FDBEA12-6569-E694-2888-AD7F8982AB5B}"/>
               </a:ext>
             </a:extLst>
           </p:cNvPr>
@@ -25923,8 +25935,8 @@
         </p:blipFill>
         <p:spPr>
           <a:xfrm>
-            <a:off x="2376487" y="3324066"/>
-            <a:ext cx="5940425" cy="913130"/>
+            <a:off x="2446020" y="3194844"/>
+            <a:ext cx="5801360" cy="1171575"/>
           </a:xfrm>
           <a:prstGeom prst="rect">
             <a:avLst/>
@@ -26141,10 +26153,10 @@
       </p:sp>
       <p:pic>
         <p:nvPicPr>
-          <p:cNvPr id="2" name="Рисунок 1">
+          <p:cNvPr id="3" name="Рисунок 2">
             <a:extLst>
               <a:ext uri="{FF2B5EF4-FFF2-40B4-BE49-F238E27FC236}">
-                <a16:creationId xmlns:a16="http://schemas.microsoft.com/office/drawing/2014/main" id="{37A005E7-D51D-58A0-9A94-4F5878F9A6B1}"/>
+                <a16:creationId xmlns:a16="http://schemas.microsoft.com/office/drawing/2014/main" id="{41396A65-6A0D-FDFC-7E9D-8C2AEA799A65}"/>
               </a:ext>
             </a:extLst>
           </p:cNvPr>
@@ -26161,8 +26173,8 @@
         </p:blipFill>
         <p:spPr>
           <a:xfrm>
-            <a:off x="2376487" y="3326606"/>
-            <a:ext cx="5940425" cy="908050"/>
+            <a:off x="2465070" y="3194844"/>
+            <a:ext cx="5763260" cy="1171575"/>
           </a:xfrm>
           <a:prstGeom prst="rect">
             <a:avLst/>
@@ -26379,10 +26391,10 @@
       </p:sp>
       <p:pic>
         <p:nvPicPr>
-          <p:cNvPr id="2" name="Рисунок 1">
+          <p:cNvPr id="3" name="Рисунок 2">
             <a:extLst>
               <a:ext uri="{FF2B5EF4-FFF2-40B4-BE49-F238E27FC236}">
-                <a16:creationId xmlns:a16="http://schemas.microsoft.com/office/drawing/2014/main" id="{8334F759-90EA-0E99-229A-2055D9908F52}"/>
+                <a16:creationId xmlns:a16="http://schemas.microsoft.com/office/drawing/2014/main" id="{1663453E-7690-F9BE-72DF-B8BDA20ACBF1}"/>
               </a:ext>
             </a:extLst>
           </p:cNvPr>
@@ -26399,8 +26411,8 @@
         </p:blipFill>
         <p:spPr>
           <a:xfrm>
-            <a:off x="3122612" y="2980531"/>
-            <a:ext cx="4448175" cy="1600200"/>
+            <a:off x="2812732" y="3180556"/>
+            <a:ext cx="5067935" cy="1200150"/>
           </a:xfrm>
           <a:prstGeom prst="rect">
             <a:avLst/>
@@ -29137,7 +29149,7 @@
         </p:spPr>
         <p:txBody>
           <a:bodyPr spcFirstLastPara="1" wrap="square" lIns="104300" tIns="52150" rIns="104300" bIns="52150" anchor="t" anchorCtr="0">
-            <a:normAutofit lnSpcReduction="10000"/>
+            <a:normAutofit/>
           </a:bodyPr>
           <a:lstStyle/>
           <a:p>
@@ -29170,7 +29182,7 @@
                 <a:cs typeface="Times New Roman"/>
                 <a:sym typeface="Times New Roman"/>
               </a:rPr>
-              <a:t>Облеухин</a:t>
+              <a:t>Разанова</a:t>
             </a:r>
             <a:r>
               <a:rPr lang="ru-RU" sz="1600" dirty="0">
@@ -29179,7 +29191,25 @@
                 <a:cs typeface="Times New Roman"/>
                 <a:sym typeface="Times New Roman"/>
               </a:rPr>
-              <a:t> Максим Вадимович, проходил учебную практику в лабораторных условиях на базе Университета «Синергия». </a:t>
+              <a:t> Камила </a:t>
+            </a:r>
+            <a:r>
+              <a:rPr lang="ru-RU" sz="1600" dirty="0" err="1">
+                <a:latin typeface="Times New Roman"/>
+                <a:ea typeface="Times New Roman"/>
+                <a:cs typeface="Times New Roman"/>
+                <a:sym typeface="Times New Roman"/>
+              </a:rPr>
+              <a:t>Разановна</a:t>
+            </a:r>
+            <a:r>
+              <a:rPr lang="ru-RU" sz="1600" dirty="0">
+                <a:latin typeface="Times New Roman"/>
+                <a:ea typeface="Times New Roman"/>
+                <a:cs typeface="Times New Roman"/>
+                <a:sym typeface="Times New Roman"/>
+              </a:rPr>
+              <a:t>, проходила учебную практику в лабораторных условиях на базе Университета «Синергия». </a:t>
             </a:r>
             <a:endParaRPr sz="1600" dirty="0">
               <a:latin typeface="Times New Roman"/>
@@ -29209,22 +29239,8 @@
                 <a:cs typeface="Times New Roman"/>
                 <a:sym typeface="Times New Roman"/>
               </a:rPr>
-              <a:t>При выполнении индивидуального задания по практике решал кейс № 23 по интеграции СКВ в организацию по </a:t>
+              <a:t>При выполнении индивидуального задания по практике решала кейс № 17 </a:t>
             </a:r>
-            <a:r>
-              <a:rPr lang="ru-RU" sz="1600" dirty="0">
-                <a:effectLst/>
-                <a:latin typeface="Times New Roman" panose="02020603050405020304" pitchFamily="18" charset="0"/>
-                <a:ea typeface="Calibri" panose="020F0502020204030204" pitchFamily="34" charset="0"/>
-              </a:rPr>
-              <a:t>производству, распределению, потреблению энергии.</a:t>
-            </a:r>
-            <a:endParaRPr sz="1600" dirty="0">
-              <a:latin typeface="Times New Roman"/>
-              <a:ea typeface="Times New Roman"/>
-              <a:cs typeface="Times New Roman"/>
-              <a:sym typeface="Times New Roman"/>
-            </a:endParaRPr>
           </a:p>
           <a:p>
             <a:pPr marL="457200" lvl="0" indent="0" algn="l" rtl="0">
@@ -29277,7 +29293,7 @@
                 <a:cs typeface="Times New Roman"/>
                 <a:sym typeface="Times New Roman"/>
               </a:rPr>
-              <a:t>•	Принял участие в организационном собрании по практике.</a:t>
+              <a:t>•	Приняла участие в организационном собрании по практике.</a:t>
             </a:r>
             <a:endParaRPr sz="1600" dirty="0">
               <a:latin typeface="Times New Roman"/>
@@ -29307,7 +29323,7 @@
                 <a:cs typeface="Times New Roman"/>
                 <a:sym typeface="Times New Roman"/>
               </a:rPr>
-              <a:t>•	Ознакомился комплектом шаблонов отчетной документации по практике.</a:t>
+              <a:t>•	Ознакомилась комплектом шаблонов отчетной документации по практике.</a:t>
             </a:r>
             <a:endParaRPr sz="1600" dirty="0">
               <a:latin typeface="Times New Roman"/>
@@ -29337,7 +29353,7 @@
                 <a:cs typeface="Times New Roman"/>
                 <a:sym typeface="Times New Roman"/>
               </a:rPr>
-              <a:t>•	Уточнил контакты руководителя практики от Образовательной организации, а также правила в отношении субординации, внешнего вида, графика работы, техники безопасности:</a:t>
+              <a:t>•	Уточнила контакты руководителя практики от Образовательной организации, а также правила в отношении субординации, внешнего вида, графика работы, техники безопасности:</a:t>
             </a:r>
             <a:endParaRPr sz="1600" dirty="0">
               <a:latin typeface="Times New Roman"/>
@@ -30177,10 +30193,10 @@
       </p:sp>
       <p:pic>
         <p:nvPicPr>
-          <p:cNvPr id="3" name="Рисунок 2">
+          <p:cNvPr id="6" name="Рисунок 5">
             <a:extLst>
               <a:ext uri="{FF2B5EF4-FFF2-40B4-BE49-F238E27FC236}">
-                <a16:creationId xmlns:a16="http://schemas.microsoft.com/office/drawing/2014/main" id="{33630B26-DBD6-729E-AF88-D21E89F9239F}"/>
+                <a16:creationId xmlns:a16="http://schemas.microsoft.com/office/drawing/2014/main" id="{4918BD08-C66F-E507-4232-849AAB7EF01C}"/>
               </a:ext>
             </a:extLst>
           </p:cNvPr>
@@ -30197,8 +30213,8 @@
         </p:blipFill>
         <p:spPr>
           <a:xfrm>
-            <a:off x="1500201" y="2768025"/>
-            <a:ext cx="7397246" cy="4324206"/>
+            <a:off x="2350755" y="2816946"/>
+            <a:ext cx="5760511" cy="3700077"/>
           </a:xfrm>
           <a:prstGeom prst="rect">
             <a:avLst/>
@@ -30463,10 +30479,10 @@
       </p:sp>
       <p:pic>
         <p:nvPicPr>
-          <p:cNvPr id="2" name="Рисунок 1">
+          <p:cNvPr id="5" name="Рисунок 4">
             <a:extLst>
               <a:ext uri="{FF2B5EF4-FFF2-40B4-BE49-F238E27FC236}">
-                <a16:creationId xmlns:a16="http://schemas.microsoft.com/office/drawing/2014/main" id="{942DD972-15FC-B5D5-F23B-98401E8F3A4A}"/>
+                <a16:creationId xmlns:a16="http://schemas.microsoft.com/office/drawing/2014/main" id="{DA3724EC-3802-F45E-8419-3E15C6B2D582}"/>
               </a:ext>
             </a:extLst>
           </p:cNvPr>
@@ -30483,8 +30499,8 @@
         </p:blipFill>
         <p:spPr>
           <a:xfrm>
-            <a:off x="368273" y="2861169"/>
-            <a:ext cx="4667885" cy="1019175"/>
+            <a:off x="368273" y="2659976"/>
+            <a:ext cx="4114819" cy="1441497"/>
           </a:xfrm>
           <a:prstGeom prst="rect">
             <a:avLst/>
@@ -30493,10 +30509,10 @@
       </p:pic>
       <p:pic>
         <p:nvPicPr>
-          <p:cNvPr id="3" name="Рисунок 2">
+          <p:cNvPr id="6" name="Рисунок 5">
             <a:extLst>
               <a:ext uri="{FF2B5EF4-FFF2-40B4-BE49-F238E27FC236}">
-                <a16:creationId xmlns:a16="http://schemas.microsoft.com/office/drawing/2014/main" id="{BC3FFE33-52B4-F905-C9E4-EE078A1B6290}"/>
+                <a16:creationId xmlns:a16="http://schemas.microsoft.com/office/drawing/2014/main" id="{E4321BAE-6841-31D9-A20E-28B911D66918}"/>
               </a:ext>
             </a:extLst>
           </p:cNvPr>
@@ -30507,13 +30523,14 @@
         </p:nvPicPr>
         <p:blipFill>
           <a:blip r:embed="rId4"/>
-          <a:srcRect t="59143" b="6227"/>
-          <a:stretch/>
+          <a:stretch>
+            <a:fillRect/>
+          </a:stretch>
         </p:blipFill>
         <p:spPr>
           <a:xfrm>
-            <a:off x="2376487" y="3984115"/>
-            <a:ext cx="5940425" cy="770766"/>
+            <a:off x="2129061" y="4133747"/>
+            <a:ext cx="5940425" cy="666750"/>
           </a:xfrm>
           <a:prstGeom prst="rect">
             <a:avLst/>
@@ -30522,10 +30539,10 @@
       </p:pic>
       <p:pic>
         <p:nvPicPr>
-          <p:cNvPr id="4" name="Рисунок 3">
+          <p:cNvPr id="7" name="Рисунок 6">
             <a:extLst>
               <a:ext uri="{FF2B5EF4-FFF2-40B4-BE49-F238E27FC236}">
-                <a16:creationId xmlns:a16="http://schemas.microsoft.com/office/drawing/2014/main" id="{80C67C73-0219-C513-12FF-F7D864F1CC1D}"/>
+                <a16:creationId xmlns:a16="http://schemas.microsoft.com/office/drawing/2014/main" id="{F47794F9-935F-1AD8-446E-7E7FA2530331}"/>
               </a:ext>
             </a:extLst>
           </p:cNvPr>
@@ -30542,8 +30559,8 @@
         </p:blipFill>
         <p:spPr>
           <a:xfrm>
-            <a:off x="4796599" y="4858652"/>
-            <a:ext cx="5940425" cy="1689735"/>
+            <a:off x="5042638" y="4882841"/>
+            <a:ext cx="4807006" cy="1710475"/>
           </a:xfrm>
           <a:prstGeom prst="rect">
             <a:avLst/>
@@ -30575,35 +30592,6 @@
           <a:chExt cx="0" cy="0"/>
         </a:xfrm>
       </p:grpSpPr>
-      <p:pic>
-        <p:nvPicPr>
-          <p:cNvPr id="4" name="Рисунок 3">
-            <a:extLst>
-              <a:ext uri="{FF2B5EF4-FFF2-40B4-BE49-F238E27FC236}">
-                <a16:creationId xmlns:a16="http://schemas.microsoft.com/office/drawing/2014/main" id="{F1CBE1B4-15B0-7167-5CBE-49C0AD0A68BC}"/>
-              </a:ext>
-            </a:extLst>
-          </p:cNvPr>
-          <p:cNvPicPr>
-            <a:picLocks noChangeAspect="1"/>
-          </p:cNvPicPr>
-          <p:nvPr/>
-        </p:nvPicPr>
-        <p:blipFill>
-          <a:blip r:embed="rId3"/>
-          <a:srcRect b="57236"/>
-          <a:stretch/>
-        </p:blipFill>
-        <p:spPr>
-          <a:xfrm>
-            <a:off x="269443" y="2893304"/>
-            <a:ext cx="5940425" cy="2782283"/>
-          </a:xfrm>
-          <a:prstGeom prst="rect">
-            <a:avLst/>
-          </a:prstGeom>
-        </p:spPr>
-      </p:pic>
       <p:sp>
         <p:nvSpPr>
           <p:cNvPr id="196" name="Google Shape;196;g2c2613dc383_0_6"/>
@@ -30837,10 +30825,41 @@
       </p:sp>
       <p:pic>
         <p:nvPicPr>
-          <p:cNvPr id="2" name="Рисунок 1">
+          <p:cNvPr id="5" name="Рисунок 4">
             <a:extLst>
               <a:ext uri="{FF2B5EF4-FFF2-40B4-BE49-F238E27FC236}">
-                <a16:creationId xmlns:a16="http://schemas.microsoft.com/office/drawing/2014/main" id="{72C5BDEF-9FBF-3A68-33FF-E9BC7982E800}"/>
+                <a16:creationId xmlns:a16="http://schemas.microsoft.com/office/drawing/2014/main" id="{2AF1DF88-4680-26F6-49A6-46A5DFA6DAC4}"/>
+              </a:ext>
+            </a:extLst>
+          </p:cNvPr>
+          <p:cNvPicPr>
+            <a:picLocks noChangeAspect="1"/>
+          </p:cNvPicPr>
+          <p:nvPr/>
+        </p:nvPicPr>
+        <p:blipFill>
+          <a:blip r:embed="rId3"/>
+          <a:srcRect b="40568"/>
+          <a:stretch>
+            <a:fillRect/>
+          </a:stretch>
+        </p:blipFill>
+        <p:spPr>
+          <a:xfrm>
+            <a:off x="176876" y="2593677"/>
+            <a:ext cx="4965279" cy="3148114"/>
+          </a:xfrm>
+          <a:prstGeom prst="rect">
+            <a:avLst/>
+          </a:prstGeom>
+        </p:spPr>
+      </p:pic>
+      <p:pic>
+        <p:nvPicPr>
+          <p:cNvPr id="6" name="Рисунок 5">
+            <a:extLst>
+              <a:ext uri="{FF2B5EF4-FFF2-40B4-BE49-F238E27FC236}">
+                <a16:creationId xmlns:a16="http://schemas.microsoft.com/office/drawing/2014/main" id="{35904BAE-F5DA-0B5E-64AE-7D52E463A818}"/>
               </a:ext>
             </a:extLst>
           </p:cNvPr>
@@ -30857,8 +30876,8 @@
         </p:blipFill>
         <p:spPr>
           <a:xfrm>
-            <a:off x="2241710" y="4464430"/>
-            <a:ext cx="5940425" cy="2875915"/>
+            <a:off x="2050279" y="4508370"/>
+            <a:ext cx="5940425" cy="2677160"/>
           </a:xfrm>
           <a:prstGeom prst="rect">
             <a:avLst/>
@@ -30867,10 +30886,10 @@
       </p:pic>
       <p:pic>
         <p:nvPicPr>
-          <p:cNvPr id="3" name="Рисунок 2">
+          <p:cNvPr id="7" name="Рисунок 6">
             <a:extLst>
               <a:ext uri="{FF2B5EF4-FFF2-40B4-BE49-F238E27FC236}">
-                <a16:creationId xmlns:a16="http://schemas.microsoft.com/office/drawing/2014/main" id="{33C2B855-8603-4B05-E79F-4843163F97F9}"/>
+                <a16:creationId xmlns:a16="http://schemas.microsoft.com/office/drawing/2014/main" id="{76C00461-7E99-A3E3-8801-7BBF71B29A4C}"/>
               </a:ext>
             </a:extLst>
           </p:cNvPr>
@@ -30887,8 +30906,8 @@
         </p:blipFill>
         <p:spPr>
           <a:xfrm>
-            <a:off x="4667539" y="3140278"/>
-            <a:ext cx="5848985" cy="1819275"/>
+            <a:off x="5211923" y="2768958"/>
+            <a:ext cx="5201285" cy="1838325"/>
           </a:xfrm>
           <a:prstGeom prst="rect">
             <a:avLst/>
@@ -31105,10 +31124,10 @@
       </p:sp>
       <p:pic>
         <p:nvPicPr>
-          <p:cNvPr id="2" name="Рисунок 1">
+          <p:cNvPr id="3" name="Рисунок 2">
             <a:extLst>
               <a:ext uri="{FF2B5EF4-FFF2-40B4-BE49-F238E27FC236}">
-                <a16:creationId xmlns:a16="http://schemas.microsoft.com/office/drawing/2014/main" id="{26BD8560-5137-0A17-8295-6FD4BAA557BA}"/>
+                <a16:creationId xmlns:a16="http://schemas.microsoft.com/office/drawing/2014/main" id="{E35F3A28-303A-C1CA-455C-822194A60ED5}"/>
               </a:ext>
             </a:extLst>
           </p:cNvPr>
@@ -31125,8 +31144,8 @@
         </p:blipFill>
         <p:spPr>
           <a:xfrm>
-            <a:off x="3198812" y="2780506"/>
-            <a:ext cx="4295775" cy="2000250"/>
+            <a:off x="2684145" y="2666206"/>
+            <a:ext cx="5325110" cy="2228850"/>
           </a:xfrm>
           <a:prstGeom prst="rect">
             <a:avLst/>
@@ -31367,10 +31386,10 @@
       </p:sp>
       <p:pic>
         <p:nvPicPr>
-          <p:cNvPr id="2" name="Рисунок 1">
+          <p:cNvPr id="5" name="Рисунок 4">
             <a:extLst>
               <a:ext uri="{FF2B5EF4-FFF2-40B4-BE49-F238E27FC236}">
-                <a16:creationId xmlns:a16="http://schemas.microsoft.com/office/drawing/2014/main" id="{B36E7A7C-66F6-7517-26AA-CF065F27F2F1}"/>
+                <a16:creationId xmlns:a16="http://schemas.microsoft.com/office/drawing/2014/main" id="{7C7E63EC-26FD-F9F2-0A77-32BE502D5891}"/>
               </a:ext>
             </a:extLst>
           </p:cNvPr>
@@ -31387,8 +31406,8 @@
         </p:blipFill>
         <p:spPr>
           <a:xfrm>
-            <a:off x="321969" y="2856706"/>
-            <a:ext cx="4582160" cy="1847850"/>
+            <a:off x="321969" y="2953243"/>
+            <a:ext cx="4367114" cy="999864"/>
           </a:xfrm>
           <a:prstGeom prst="rect">
             <a:avLst/>
@@ -31397,10 +31416,10 @@
       </p:pic>
       <p:pic>
         <p:nvPicPr>
-          <p:cNvPr id="3" name="Рисунок 2">
+          <p:cNvPr id="6" name="Рисунок 5">
             <a:extLst>
               <a:ext uri="{FF2B5EF4-FFF2-40B4-BE49-F238E27FC236}">
-                <a16:creationId xmlns:a16="http://schemas.microsoft.com/office/drawing/2014/main" id="{25B04499-3973-2E23-CD5F-45BBCD5F79A4}"/>
+                <a16:creationId xmlns:a16="http://schemas.microsoft.com/office/drawing/2014/main" id="{0B487104-3BC7-C3C6-DF10-F50F929FDF5A}"/>
               </a:ext>
             </a:extLst>
           </p:cNvPr>
@@ -31417,8 +31436,8 @@
         </p:blipFill>
         <p:spPr>
           <a:xfrm>
-            <a:off x="1849362" y="4608018"/>
-            <a:ext cx="5940425" cy="2196465"/>
+            <a:off x="1155187" y="4169990"/>
+            <a:ext cx="5940425" cy="2594610"/>
           </a:xfrm>
           <a:prstGeom prst="rect">
             <a:avLst/>
@@ -31427,10 +31446,10 @@
       </p:pic>
       <p:pic>
         <p:nvPicPr>
-          <p:cNvPr id="4" name="Рисунок 3">
+          <p:cNvPr id="7" name="Рисунок 6">
             <a:extLst>
               <a:ext uri="{FF2B5EF4-FFF2-40B4-BE49-F238E27FC236}">
-                <a16:creationId xmlns:a16="http://schemas.microsoft.com/office/drawing/2014/main" id="{6D5761F3-9920-F522-03A1-2FB3EAAE4A3E}"/>
+                <a16:creationId xmlns:a16="http://schemas.microsoft.com/office/drawing/2014/main" id="{36936935-F704-C7D9-46FD-3D4BACC0ED1D}"/>
               </a:ext>
             </a:extLst>
           </p:cNvPr>
@@ -31447,8 +31466,8 @@
         </p:blipFill>
         <p:spPr>
           <a:xfrm>
-            <a:off x="5196051" y="3101187"/>
-            <a:ext cx="5175380" cy="1358887"/>
+            <a:off x="5211922" y="2872955"/>
+            <a:ext cx="5353685" cy="1600200"/>
           </a:xfrm>
           <a:prstGeom prst="rect">
             <a:avLst/>

</xml_diff>